<commit_message>
Figure 4 has been updated
</commit_message>
<xml_diff>
--- a/figs/entangled.pptx
+++ b/figs/entangled.pptx
@@ -273,7 +273,7 @@
           <a:p>
             <a:fld id="{BDBE878C-78B8-2645-91D8-3B35F37F1941}" type="datetimeFigureOut">
               <a:rPr lang="en-GB" smtClean="0"/>
-              <a:t>22/05/2020</a:t>
+              <a:t>23/05/2020</a:t>
             </a:fld>
             <a:endParaRPr lang="en-GB"/>
           </a:p>
@@ -473,7 +473,7 @@
           <a:p>
             <a:fld id="{BDBE878C-78B8-2645-91D8-3B35F37F1941}" type="datetimeFigureOut">
               <a:rPr lang="en-GB" smtClean="0"/>
-              <a:t>22/05/2020</a:t>
+              <a:t>23/05/2020</a:t>
             </a:fld>
             <a:endParaRPr lang="en-GB"/>
           </a:p>
@@ -683,7 +683,7 @@
           <a:p>
             <a:fld id="{BDBE878C-78B8-2645-91D8-3B35F37F1941}" type="datetimeFigureOut">
               <a:rPr lang="en-GB" smtClean="0"/>
-              <a:t>22/05/2020</a:t>
+              <a:t>23/05/2020</a:t>
             </a:fld>
             <a:endParaRPr lang="en-GB"/>
           </a:p>
@@ -883,7 +883,7 @@
           <a:p>
             <a:fld id="{BDBE878C-78B8-2645-91D8-3B35F37F1941}" type="datetimeFigureOut">
               <a:rPr lang="en-GB" smtClean="0"/>
-              <a:t>22/05/2020</a:t>
+              <a:t>23/05/2020</a:t>
             </a:fld>
             <a:endParaRPr lang="en-GB"/>
           </a:p>
@@ -1159,7 +1159,7 @@
           <a:p>
             <a:fld id="{BDBE878C-78B8-2645-91D8-3B35F37F1941}" type="datetimeFigureOut">
               <a:rPr lang="en-GB" smtClean="0"/>
-              <a:t>22/05/2020</a:t>
+              <a:t>23/05/2020</a:t>
             </a:fld>
             <a:endParaRPr lang="en-GB"/>
           </a:p>
@@ -1427,7 +1427,7 @@
           <a:p>
             <a:fld id="{BDBE878C-78B8-2645-91D8-3B35F37F1941}" type="datetimeFigureOut">
               <a:rPr lang="en-GB" smtClean="0"/>
-              <a:t>22/05/2020</a:t>
+              <a:t>23/05/2020</a:t>
             </a:fld>
             <a:endParaRPr lang="en-GB"/>
           </a:p>
@@ -1842,7 +1842,7 @@
           <a:p>
             <a:fld id="{BDBE878C-78B8-2645-91D8-3B35F37F1941}" type="datetimeFigureOut">
               <a:rPr lang="en-GB" smtClean="0"/>
-              <a:t>22/05/2020</a:t>
+              <a:t>23/05/2020</a:t>
             </a:fld>
             <a:endParaRPr lang="en-GB"/>
           </a:p>
@@ -1984,7 +1984,7 @@
           <a:p>
             <a:fld id="{BDBE878C-78B8-2645-91D8-3B35F37F1941}" type="datetimeFigureOut">
               <a:rPr lang="en-GB" smtClean="0"/>
-              <a:t>22/05/2020</a:t>
+              <a:t>23/05/2020</a:t>
             </a:fld>
             <a:endParaRPr lang="en-GB"/>
           </a:p>
@@ -2097,7 +2097,7 @@
           <a:p>
             <a:fld id="{BDBE878C-78B8-2645-91D8-3B35F37F1941}" type="datetimeFigureOut">
               <a:rPr lang="en-GB" smtClean="0"/>
-              <a:t>22/05/2020</a:t>
+              <a:t>23/05/2020</a:t>
             </a:fld>
             <a:endParaRPr lang="en-GB"/>
           </a:p>
@@ -2410,7 +2410,7 @@
           <a:p>
             <a:fld id="{BDBE878C-78B8-2645-91D8-3B35F37F1941}" type="datetimeFigureOut">
               <a:rPr lang="en-GB" smtClean="0"/>
-              <a:t>22/05/2020</a:t>
+              <a:t>23/05/2020</a:t>
             </a:fld>
             <a:endParaRPr lang="en-GB"/>
           </a:p>
@@ -2699,7 +2699,7 @@
           <a:p>
             <a:fld id="{BDBE878C-78B8-2645-91D8-3B35F37F1941}" type="datetimeFigureOut">
               <a:rPr lang="en-GB" smtClean="0"/>
-              <a:t>22/05/2020</a:t>
+              <a:t>23/05/2020</a:t>
             </a:fld>
             <a:endParaRPr lang="en-GB"/>
           </a:p>
@@ -2942,7 +2942,7 @@
           <a:p>
             <a:fld id="{BDBE878C-78B8-2645-91D8-3B35F37F1941}" type="datetimeFigureOut">
               <a:rPr lang="en-GB" smtClean="0"/>
-              <a:t>22/05/2020</a:t>
+              <a:t>23/05/2020</a:t>
             </a:fld>
             <a:endParaRPr lang="en-GB"/>
           </a:p>
@@ -3405,12 +3405,12 @@
           <a:p>
             <a:pPr algn="ctr"/>
             <a:r>
-              <a:rPr lang="en-GB" sz="1600" dirty="0">
+              <a:rPr lang="en-GB" sz="1600" dirty="0" err="1">
                 <a:solidFill>
                   <a:schemeClr val="tx1"/>
                 </a:solidFill>
               </a:rPr>
-              <a:t>CTop</a:t>
+              <a:t>TopFilter</a:t>
             </a:r>
             <a:endParaRPr lang="en-GB" dirty="0">
               <a:solidFill>

</xml_diff>